<commit_message>
Single page app presentation
</commit_message>
<xml_diff>
--- a/Fundamentals/Fundamentals-Presentation.pptx
+++ b/Fundamentals/Fundamentals-Presentation.pptx
@@ -8,11 +8,10 @@
     <p:sldId id="256" r:id="rId2"/>
     <p:sldId id="257" r:id="rId3"/>
     <p:sldId id="258" r:id="rId4"/>
-    <p:sldId id="259" r:id="rId5"/>
-    <p:sldId id="260" r:id="rId6"/>
-    <p:sldId id="261" r:id="rId7"/>
-    <p:sldId id="262" r:id="rId8"/>
-    <p:sldId id="263" r:id="rId9"/>
+    <p:sldId id="260" r:id="rId5"/>
+    <p:sldId id="261" r:id="rId6"/>
+    <p:sldId id="262" r:id="rId7"/>
+    <p:sldId id="263" r:id="rId8"/>
   </p:sldIdLst>
   <p:sldSz cx="9144000" cy="6858000" type="screen4x3"/>
   <p:notesSz cx="6858000" cy="9144000"/>
@@ -119,7 +118,6 @@
             <p14:sldId id="256"/>
             <p14:sldId id="257"/>
             <p14:sldId id="258"/>
-            <p14:sldId id="259"/>
             <p14:sldId id="260"/>
             <p14:sldId id="261"/>
             <p14:sldId id="262"/>
@@ -3449,7 +3447,7 @@
           <a:p>
             <a:r>
               <a:rPr lang="en-AU" dirty="0" smtClean="0"/>
-              <a:t>The Single Page App (SPA)</a:t>
+              <a:t>Basics - Primitives</a:t>
             </a:r>
             <a:endParaRPr lang="en-AU" dirty="0"/>
           </a:p>
@@ -3472,86 +3470,36 @@
           <a:p>
             <a:r>
               <a:rPr lang="en-AU" dirty="0" smtClean="0"/>
-              <a:t>JavaScript does everything (well, almost)</a:t>
+              <a:t>Numbers</a:t>
             </a:r>
           </a:p>
           <a:p>
             <a:r>
               <a:rPr lang="en-AU" dirty="0" smtClean="0"/>
-              <a:t>Angular, Ember, React, Backbone </a:t>
-            </a:r>
-            <a:r>
-              <a:rPr lang="en-AU" dirty="0" err="1" smtClean="0"/>
-              <a:t>etc</a:t>
-            </a:r>
+              <a:t>Arrays</a:t>
+            </a:r>
+          </a:p>
+          <a:p>
             <a:r>
               <a:rPr lang="en-AU" dirty="0" smtClean="0"/>
-              <a:t> …</a:t>
-            </a:r>
-          </a:p>
-          <a:p>
-            <a:endParaRPr lang="en-AU" dirty="0"/>
-          </a:p>
-        </p:txBody>
-      </p:sp>
-      <p:pic>
-        <p:nvPicPr>
-          <p:cNvPr id="1026" name="Picture 2"/>
-          <p:cNvPicPr>
-            <a:picLocks noChangeAspect="1" noChangeArrowheads="1"/>
-          </p:cNvPicPr>
-          <p:nvPr/>
-        </p:nvPicPr>
-        <p:blipFill>
-          <a:blip r:embed="rId2">
-            <a:extLst>
-              <a:ext uri="{28A0092B-C50C-407E-A947-70E740481C1C}">
-                <a14:useLocalDpi xmlns:a14="http://schemas.microsoft.com/office/drawing/2010/main" val="0"/>
-              </a:ext>
-            </a:extLst>
-          </a:blip>
-          <a:srcRect/>
-          <a:stretch>
-            <a:fillRect/>
-          </a:stretch>
-        </p:blipFill>
-        <p:spPr bwMode="auto">
-          <a:xfrm>
-            <a:off x="516391" y="3048000"/>
-            <a:ext cx="8067675" cy="3438525"/>
-          </a:xfrm>
-          <a:prstGeom prst="rect">
-            <a:avLst/>
-          </a:prstGeom>
-          <a:noFill/>
-          <a:ln>
-            <a:noFill/>
-          </a:ln>
-          <a:extLst>
-            <a:ext uri="{909E8E84-426E-40DD-AFC4-6F175D3DCCD1}">
-              <a14:hiddenFill xmlns:a14="http://schemas.microsoft.com/office/drawing/2010/main">
-                <a:solidFill>
-                  <a:schemeClr val="accent1"/>
-                </a:solidFill>
-              </a14:hiddenFill>
-            </a:ext>
-            <a:ext uri="{91240B29-F687-4F45-9708-019B960494DF}">
-              <a14:hiddenLine xmlns:a14="http://schemas.microsoft.com/office/drawing/2010/main" w="9525">
-                <a:solidFill>
-                  <a:schemeClr val="tx1"/>
-                </a:solidFill>
-                <a:miter lim="800000"/>
-                <a:headEnd/>
-                <a:tailEnd/>
-              </a14:hiddenLine>
-            </a:ext>
-          </a:extLst>
-        </p:spPr>
-      </p:pic>
+              <a:t>Strings</a:t>
+            </a:r>
+          </a:p>
+          <a:p>
+            <a:r>
+              <a:rPr lang="en-AU" dirty="0" smtClean="0"/>
+              <a:t>Null vs Undefined</a:t>
+            </a:r>
+          </a:p>
+          <a:p>
+            <a:endParaRPr lang="en-AU" dirty="0" smtClean="0"/>
+          </a:p>
+        </p:txBody>
+      </p:sp>
     </p:spTree>
     <p:extLst>
       <p:ext uri="{BB962C8B-B14F-4D97-AF65-F5344CB8AC3E}">
-        <p14:creationId xmlns:p14="http://schemas.microsoft.com/office/powerpoint/2010/main" val="2729582759"/>
+        <p14:creationId xmlns:p14="http://schemas.microsoft.com/office/powerpoint/2010/main" val="4005965628"/>
       </p:ext>
     </p:extLst>
   </p:cSld>
@@ -3595,7 +3543,7 @@
           <a:p>
             <a:r>
               <a:rPr lang="en-AU" dirty="0" smtClean="0"/>
-              <a:t>Basics - Primitives</a:t>
+              <a:t>Objects, Functions and Prototypes</a:t>
             </a:r>
             <a:endParaRPr lang="en-AU" dirty="0"/>
           </a:p>
@@ -3618,36 +3566,33 @@
           <a:p>
             <a:r>
               <a:rPr lang="en-AU" dirty="0" smtClean="0"/>
-              <a:t>Numbers</a:t>
+              <a:t>JavaScript uses prototypes</a:t>
             </a:r>
           </a:p>
           <a:p>
             <a:r>
               <a:rPr lang="en-AU" dirty="0" smtClean="0"/>
-              <a:t>Arrays</a:t>
+              <a:t>Object literals == JSON</a:t>
             </a:r>
           </a:p>
           <a:p>
             <a:r>
               <a:rPr lang="en-AU" dirty="0" smtClean="0"/>
-              <a:t>Strings</a:t>
-            </a:r>
-          </a:p>
-          <a:p>
-            <a:r>
-              <a:rPr lang="en-AU" dirty="0" smtClean="0"/>
-              <a:t>Null vs Undefined</a:t>
+              <a:t>Accessing properties with arrays</a:t>
             </a:r>
           </a:p>
           <a:p>
             <a:endParaRPr lang="en-AU" dirty="0" smtClean="0"/>
+          </a:p>
+          <a:p>
+            <a:endParaRPr lang="en-AU" dirty="0"/>
           </a:p>
         </p:txBody>
       </p:sp>
     </p:spTree>
     <p:extLst>
       <p:ext uri="{BB962C8B-B14F-4D97-AF65-F5344CB8AC3E}">
-        <p14:creationId xmlns:p14="http://schemas.microsoft.com/office/powerpoint/2010/main" val="4005965628"/>
+        <p14:creationId xmlns:p14="http://schemas.microsoft.com/office/powerpoint/2010/main" val="3099490218"/>
       </p:ext>
     </p:extLst>
   </p:cSld>
@@ -3691,99 +3636,6 @@
           <a:p>
             <a:r>
               <a:rPr lang="en-AU" dirty="0" smtClean="0"/>
-              <a:t>Objects, Functions and Prototypes</a:t>
-            </a:r>
-            <a:endParaRPr lang="en-AU" dirty="0"/>
-          </a:p>
-        </p:txBody>
-      </p:sp>
-      <p:sp>
-        <p:nvSpPr>
-          <p:cNvPr id="3" name="Content Placeholder 2"/>
-          <p:cNvSpPr>
-            <a:spLocks noGrp="1"/>
-          </p:cNvSpPr>
-          <p:nvPr>
-            <p:ph idx="1"/>
-          </p:nvPr>
-        </p:nvSpPr>
-        <p:spPr/>
-        <p:txBody>
-          <a:bodyPr/>
-          <a:lstStyle/>
-          <a:p>
-            <a:r>
-              <a:rPr lang="en-AU" dirty="0" smtClean="0"/>
-              <a:t>JavaScript uses prototypes</a:t>
-            </a:r>
-          </a:p>
-          <a:p>
-            <a:r>
-              <a:rPr lang="en-AU" dirty="0" smtClean="0"/>
-              <a:t>Object literals == JSON</a:t>
-            </a:r>
-          </a:p>
-          <a:p>
-            <a:r>
-              <a:rPr lang="en-AU" dirty="0" smtClean="0"/>
-              <a:t>Accessing properties with arrays</a:t>
-            </a:r>
-          </a:p>
-          <a:p>
-            <a:endParaRPr lang="en-AU" dirty="0" smtClean="0"/>
-          </a:p>
-          <a:p>
-            <a:endParaRPr lang="en-AU" dirty="0"/>
-          </a:p>
-        </p:txBody>
-      </p:sp>
-    </p:spTree>
-    <p:extLst>
-      <p:ext uri="{BB962C8B-B14F-4D97-AF65-F5344CB8AC3E}">
-        <p14:creationId xmlns:p14="http://schemas.microsoft.com/office/powerpoint/2010/main" val="3099490218"/>
-      </p:ext>
-    </p:extLst>
-  </p:cSld>
-  <p:clrMapOvr>
-    <a:masterClrMapping/>
-  </p:clrMapOvr>
-</p:sld>
-</file>
-
-<file path=ppt/slides/slide7.xml><?xml version="1.0" encoding="utf-8"?>
-<p:sld xmlns:a="http://schemas.openxmlformats.org/drawingml/2006/main" xmlns:r="http://schemas.openxmlformats.org/officeDocument/2006/relationships" xmlns:p="http://schemas.openxmlformats.org/presentationml/2006/main">
-  <p:cSld>
-    <p:spTree>
-      <p:nvGrpSpPr>
-        <p:cNvPr id="1" name=""/>
-        <p:cNvGrpSpPr/>
-        <p:nvPr/>
-      </p:nvGrpSpPr>
-      <p:grpSpPr>
-        <a:xfrm>
-          <a:off x="0" y="0"/>
-          <a:ext cx="0" cy="0"/>
-          <a:chOff x="0" y="0"/>
-          <a:chExt cx="0" cy="0"/>
-        </a:xfrm>
-      </p:grpSpPr>
-      <p:sp>
-        <p:nvSpPr>
-          <p:cNvPr id="2" name="Title 1"/>
-          <p:cNvSpPr>
-            <a:spLocks noGrp="1"/>
-          </p:cNvSpPr>
-          <p:nvPr>
-            <p:ph type="title"/>
-          </p:nvPr>
-        </p:nvSpPr>
-        <p:spPr/>
-        <p:txBody>
-          <a:bodyPr/>
-          <a:lstStyle/>
-          <a:p>
-            <a:r>
-              <a:rPr lang="en-AU" dirty="0" smtClean="0"/>
               <a:t>Closures</a:t>
             </a:r>
             <a:endParaRPr lang="en-AU" dirty="0"/>
@@ -3840,7 +3692,7 @@
 </p:sld>
 </file>
 
-<file path=ppt/slides/slide8.xml><?xml version="1.0" encoding="utf-8"?>
+<file path=ppt/slides/slide7.xml><?xml version="1.0" encoding="utf-8"?>
 <p:sld xmlns:a="http://schemas.openxmlformats.org/drawingml/2006/main" xmlns:r="http://schemas.openxmlformats.org/officeDocument/2006/relationships" xmlns:p="http://schemas.openxmlformats.org/presentationml/2006/main">
   <p:cSld>
     <p:spTree>

</xml_diff>

<commit_message>
Adding the demo files and more presentation stuff
</commit_message>
<xml_diff>
--- a/Fundamentals/Fundamentals-Presentation.pptx
+++ b/Fundamentals/Fundamentals-Presentation.pptx
@@ -9,9 +9,7 @@
     <p:sldId id="257" r:id="rId3"/>
     <p:sldId id="258" r:id="rId4"/>
     <p:sldId id="260" r:id="rId5"/>
-    <p:sldId id="261" r:id="rId6"/>
-    <p:sldId id="262" r:id="rId7"/>
-    <p:sldId id="263" r:id="rId8"/>
+    <p:sldId id="262" r:id="rId6"/>
   </p:sldIdLst>
   <p:sldSz cx="9144000" cy="6858000" type="screen4x3"/>
   <p:notesSz cx="6858000" cy="9144000"/>
@@ -119,9 +117,7 @@
             <p14:sldId id="257"/>
             <p14:sldId id="258"/>
             <p14:sldId id="260"/>
-            <p14:sldId id="261"/>
             <p14:sldId id="262"/>
-            <p14:sldId id="263"/>
           </p14:sldIdLst>
         </p14:section>
       </p14:sectionLst>
@@ -3447,7 +3443,7 @@
           <a:p>
             <a:r>
               <a:rPr lang="en-AU" dirty="0" smtClean="0"/>
-              <a:t>Basics - Primitives</a:t>
+              <a:t>Basics - Types</a:t>
             </a:r>
             <a:endParaRPr lang="en-AU" dirty="0"/>
           </a:p>
@@ -3487,9 +3483,48 @@
           </a:p>
           <a:p>
             <a:r>
+              <a:rPr lang="en-AU" dirty="0"/>
+              <a:t>Functions and </a:t>
+            </a:r>
+            <a:r>
               <a:rPr lang="en-AU" dirty="0" smtClean="0"/>
-              <a:t>Null vs Undefined</a:t>
-            </a:r>
+              <a:t>Objects</a:t>
+            </a:r>
+          </a:p>
+          <a:p>
+            <a:r>
+              <a:rPr lang="en-AU" dirty="0" err="1" smtClean="0"/>
+              <a:t>Truthy</a:t>
+            </a:r>
+            <a:r>
+              <a:rPr lang="en-AU" dirty="0" smtClean="0"/>
+              <a:t> and </a:t>
+            </a:r>
+            <a:r>
+              <a:rPr lang="en-AU" dirty="0" err="1" smtClean="0"/>
+              <a:t>Falsy</a:t>
+            </a:r>
+            <a:endParaRPr lang="en-AU" dirty="0" smtClean="0"/>
+          </a:p>
+          <a:p>
+            <a:r>
+              <a:rPr lang="en-AU" dirty="0" smtClean="0"/>
+              <a:t>Null </a:t>
+            </a:r>
+            <a:r>
+              <a:rPr lang="en-AU" dirty="0" smtClean="0"/>
+              <a:t>vs </a:t>
+            </a:r>
+            <a:r>
+              <a:rPr lang="en-AU" dirty="0" smtClean="0"/>
+              <a:t>Undefined</a:t>
+            </a:r>
+          </a:p>
+          <a:p>
+            <a:endParaRPr lang="en-AU" dirty="0" smtClean="0"/>
+          </a:p>
+          <a:p>
+            <a:endParaRPr lang="en-AU" dirty="0" smtClean="0"/>
           </a:p>
           <a:p>
             <a:endParaRPr lang="en-AU" dirty="0" smtClean="0"/>
@@ -3543,7 +3578,7 @@
           <a:p>
             <a:r>
               <a:rPr lang="en-AU" dirty="0" smtClean="0"/>
-              <a:t>Objects, Functions and Prototypes</a:t>
+              <a:t>Advanced</a:t>
             </a:r>
             <a:endParaRPr lang="en-AU" dirty="0"/>
           </a:p>
@@ -3566,109 +3601,31 @@
           <a:p>
             <a:r>
               <a:rPr lang="en-AU" dirty="0" smtClean="0"/>
-              <a:t>JavaScript uses prototypes</a:t>
-            </a:r>
-          </a:p>
-          <a:p>
-            <a:r>
-              <a:rPr lang="en-AU" dirty="0" smtClean="0"/>
-              <a:t>Object literals == JSON</a:t>
-            </a:r>
-          </a:p>
-          <a:p>
-            <a:r>
-              <a:rPr lang="en-AU" dirty="0" smtClean="0"/>
-              <a:t>Accessing properties with arrays</a:t>
-            </a:r>
-          </a:p>
-          <a:p>
-            <a:endParaRPr lang="en-AU" dirty="0" smtClean="0"/>
-          </a:p>
-          <a:p>
-            <a:endParaRPr lang="en-AU" dirty="0"/>
-          </a:p>
-        </p:txBody>
-      </p:sp>
-    </p:spTree>
-    <p:extLst>
-      <p:ext uri="{BB962C8B-B14F-4D97-AF65-F5344CB8AC3E}">
-        <p14:creationId xmlns:p14="http://schemas.microsoft.com/office/powerpoint/2010/main" val="3099490218"/>
-      </p:ext>
-    </p:extLst>
-  </p:cSld>
-  <p:clrMapOvr>
-    <a:masterClrMapping/>
-  </p:clrMapOvr>
-</p:sld>
-</file>
-
-<file path=ppt/slides/slide6.xml><?xml version="1.0" encoding="utf-8"?>
-<p:sld xmlns:a="http://schemas.openxmlformats.org/drawingml/2006/main" xmlns:r="http://schemas.openxmlformats.org/officeDocument/2006/relationships" xmlns:p="http://schemas.openxmlformats.org/presentationml/2006/main">
-  <p:cSld>
-    <p:spTree>
-      <p:nvGrpSpPr>
-        <p:cNvPr id="1" name=""/>
-        <p:cNvGrpSpPr/>
-        <p:nvPr/>
-      </p:nvGrpSpPr>
-      <p:grpSpPr>
-        <a:xfrm>
-          <a:off x="0" y="0"/>
-          <a:ext cx="0" cy="0"/>
-          <a:chOff x="0" y="0"/>
-          <a:chExt cx="0" cy="0"/>
-        </a:xfrm>
-      </p:grpSpPr>
-      <p:sp>
-        <p:nvSpPr>
-          <p:cNvPr id="2" name="Title 1"/>
-          <p:cNvSpPr>
-            <a:spLocks noGrp="1"/>
-          </p:cNvSpPr>
-          <p:nvPr>
-            <p:ph type="title"/>
-          </p:nvPr>
-        </p:nvSpPr>
-        <p:spPr/>
-        <p:txBody>
-          <a:bodyPr/>
-          <a:lstStyle/>
+              <a:t>Prototypes</a:t>
+            </a:r>
+          </a:p>
           <a:p>
             <a:r>
               <a:rPr lang="en-AU" dirty="0" smtClean="0"/>
               <a:t>Closures</a:t>
             </a:r>
-            <a:endParaRPr lang="en-AU" dirty="0"/>
-          </a:p>
-        </p:txBody>
-      </p:sp>
-      <p:sp>
-        <p:nvSpPr>
-          <p:cNvPr id="3" name="Content Placeholder 2"/>
-          <p:cNvSpPr>
-            <a:spLocks noGrp="1"/>
-          </p:cNvSpPr>
-          <p:nvPr>
-            <p:ph idx="1"/>
-          </p:nvPr>
-        </p:nvSpPr>
-        <p:spPr/>
-        <p:txBody>
-          <a:bodyPr/>
-          <a:lstStyle/>
-          <a:p>
+          </a:p>
+          <a:p>
+            <a:pPr lvl="1"/>
             <a:r>
               <a:rPr lang="en-AU" dirty="0" smtClean="0"/>
-              <a:t>What is ‘this’?</a:t>
-            </a:r>
-          </a:p>
-          <a:p>
+              <a:t>What </a:t>
+            </a:r>
             <a:r>
               <a:rPr lang="en-AU" dirty="0" smtClean="0"/>
-              <a:t>The window object</a:t>
-            </a:r>
-          </a:p>
-          <a:p>
+              <a:t>is ‘this’?</a:t>
+            </a:r>
+          </a:p>
+          <a:p>
+            <a:r>
+              <a:rPr lang="en-AU" dirty="0" smtClean="0"/>
+              <a:t>Timeouts and Intervals</a:t>
+            </a:r>
             <a:endParaRPr lang="en-AU" dirty="0" smtClean="0"/>
           </a:p>
           <a:p>
@@ -3683,84 +3640,6 @@
     <p:extLst>
       <p:ext uri="{BB962C8B-B14F-4D97-AF65-F5344CB8AC3E}">
         <p14:creationId xmlns:p14="http://schemas.microsoft.com/office/powerpoint/2010/main" val="187186840"/>
-      </p:ext>
-    </p:extLst>
-  </p:cSld>
-  <p:clrMapOvr>
-    <a:masterClrMapping/>
-  </p:clrMapOvr>
-</p:sld>
-</file>
-
-<file path=ppt/slides/slide7.xml><?xml version="1.0" encoding="utf-8"?>
-<p:sld xmlns:a="http://schemas.openxmlformats.org/drawingml/2006/main" xmlns:r="http://schemas.openxmlformats.org/officeDocument/2006/relationships" xmlns:p="http://schemas.openxmlformats.org/presentationml/2006/main">
-  <p:cSld>
-    <p:spTree>
-      <p:nvGrpSpPr>
-        <p:cNvPr id="1" name=""/>
-        <p:cNvGrpSpPr/>
-        <p:nvPr/>
-      </p:nvGrpSpPr>
-      <p:grpSpPr>
-        <a:xfrm>
-          <a:off x="0" y="0"/>
-          <a:ext cx="0" cy="0"/>
-          <a:chOff x="0" y="0"/>
-          <a:chExt cx="0" cy="0"/>
-        </a:xfrm>
-      </p:grpSpPr>
-      <p:sp>
-        <p:nvSpPr>
-          <p:cNvPr id="2" name="Title 1"/>
-          <p:cNvSpPr>
-            <a:spLocks noGrp="1"/>
-          </p:cNvSpPr>
-          <p:nvPr>
-            <p:ph type="title"/>
-          </p:nvPr>
-        </p:nvSpPr>
-        <p:spPr/>
-        <p:txBody>
-          <a:bodyPr>
-            <a:normAutofit/>
-          </a:bodyPr>
-          <a:lstStyle/>
-          <a:p>
-            <a:r>
-              <a:rPr lang="en-AU" dirty="0" smtClean="0"/>
-              <a:t>Timeouts, intervals &amp; </a:t>
-            </a:r>
-            <a:r>
-              <a:rPr lang="en-AU" dirty="0" err="1" smtClean="0"/>
-              <a:t>callbacks</a:t>
-            </a:r>
-            <a:endParaRPr lang="en-AU" dirty="0"/>
-          </a:p>
-        </p:txBody>
-      </p:sp>
-      <p:sp>
-        <p:nvSpPr>
-          <p:cNvPr id="3" name="Content Placeholder 2"/>
-          <p:cNvSpPr>
-            <a:spLocks noGrp="1"/>
-          </p:cNvSpPr>
-          <p:nvPr>
-            <p:ph idx="1"/>
-          </p:nvPr>
-        </p:nvSpPr>
-        <p:spPr/>
-        <p:txBody>
-          <a:bodyPr/>
-          <a:lstStyle/>
-          <a:p>
-            <a:endParaRPr lang="en-AU" dirty="0"/>
-          </a:p>
-        </p:txBody>
-      </p:sp>
-    </p:spTree>
-    <p:extLst>
-      <p:ext uri="{BB962C8B-B14F-4D97-AF65-F5344CB8AC3E}">
-        <p14:creationId xmlns:p14="http://schemas.microsoft.com/office/powerpoint/2010/main" val="1357125937"/>
       </p:ext>
     </p:extLst>
   </p:cSld>

</xml_diff>

<commit_message>
html5 up and fundamental presentation changes
</commit_message>
<xml_diff>
--- a/Fundamentals/Fundamentals-Presentation.pptx
+++ b/Fundamentals/Fundamentals-Presentation.pptx
@@ -9,7 +9,8 @@
     <p:sldId id="257" r:id="rId3"/>
     <p:sldId id="258" r:id="rId4"/>
     <p:sldId id="260" r:id="rId5"/>
-    <p:sldId id="262" r:id="rId6"/>
+    <p:sldId id="263" r:id="rId6"/>
+    <p:sldId id="262" r:id="rId7"/>
   </p:sldIdLst>
   <p:sldSz cx="9144000" cy="6858000" type="screen4x3"/>
   <p:notesSz cx="6858000" cy="9144000"/>
@@ -117,6 +118,7 @@
             <p14:sldId id="257"/>
             <p14:sldId id="258"/>
             <p14:sldId id="260"/>
+            <p14:sldId id="263"/>
             <p14:sldId id="262"/>
           </p14:sldIdLst>
         </p14:section>
@@ -308,7 +310,7 @@
             <a:fld id="{1D8BD707-D9CF-40AE-B4C6-C98DA3205C09}" type="datetimeFigureOut">
               <a:rPr lang="en-US" smtClean="0"/>
               <a:pPr/>
-              <a:t>4/8/2015</a:t>
+              <a:t>4/9/2015</a:t>
             </a:fld>
             <a:endParaRPr lang="en-US"/>
           </a:p>
@@ -475,7 +477,7 @@
             <a:fld id="{1D8BD707-D9CF-40AE-B4C6-C98DA3205C09}" type="datetimeFigureOut">
               <a:rPr lang="en-US" smtClean="0"/>
               <a:pPr/>
-              <a:t>4/8/2015</a:t>
+              <a:t>4/9/2015</a:t>
             </a:fld>
             <a:endParaRPr lang="en-US"/>
           </a:p>
@@ -652,7 +654,7 @@
             <a:fld id="{1D8BD707-D9CF-40AE-B4C6-C98DA3205C09}" type="datetimeFigureOut">
               <a:rPr lang="en-US" smtClean="0"/>
               <a:pPr/>
-              <a:t>4/8/2015</a:t>
+              <a:t>4/9/2015</a:t>
             </a:fld>
             <a:endParaRPr lang="en-US"/>
           </a:p>
@@ -819,7 +821,7 @@
             <a:fld id="{1D8BD707-D9CF-40AE-B4C6-C98DA3205C09}" type="datetimeFigureOut">
               <a:rPr lang="en-US" smtClean="0"/>
               <a:pPr/>
-              <a:t>4/8/2015</a:t>
+              <a:t>4/9/2015</a:t>
             </a:fld>
             <a:endParaRPr lang="en-US"/>
           </a:p>
@@ -1062,7 +1064,7 @@
             <a:fld id="{1D8BD707-D9CF-40AE-B4C6-C98DA3205C09}" type="datetimeFigureOut">
               <a:rPr lang="en-US" smtClean="0"/>
               <a:pPr/>
-              <a:t>4/8/2015</a:t>
+              <a:t>4/9/2015</a:t>
             </a:fld>
             <a:endParaRPr lang="en-US"/>
           </a:p>
@@ -1347,7 +1349,7 @@
             <a:fld id="{1D8BD707-D9CF-40AE-B4C6-C98DA3205C09}" type="datetimeFigureOut">
               <a:rPr lang="en-US" smtClean="0"/>
               <a:pPr/>
-              <a:t>4/8/2015</a:t>
+              <a:t>4/9/2015</a:t>
             </a:fld>
             <a:endParaRPr lang="en-US"/>
           </a:p>
@@ -1766,7 +1768,7 @@
             <a:fld id="{1D8BD707-D9CF-40AE-B4C6-C98DA3205C09}" type="datetimeFigureOut">
               <a:rPr lang="en-US" smtClean="0"/>
               <a:pPr/>
-              <a:t>4/8/2015</a:t>
+              <a:t>4/9/2015</a:t>
             </a:fld>
             <a:endParaRPr lang="en-US"/>
           </a:p>
@@ -1881,7 +1883,7 @@
             <a:fld id="{1D8BD707-D9CF-40AE-B4C6-C98DA3205C09}" type="datetimeFigureOut">
               <a:rPr lang="en-US" smtClean="0"/>
               <a:pPr/>
-              <a:t>4/8/2015</a:t>
+              <a:t>4/9/2015</a:t>
             </a:fld>
             <a:endParaRPr lang="en-US"/>
           </a:p>
@@ -1973,7 +1975,7 @@
             <a:fld id="{1D8BD707-D9CF-40AE-B4C6-C98DA3205C09}" type="datetimeFigureOut">
               <a:rPr lang="en-US" smtClean="0"/>
               <a:pPr/>
-              <a:t>4/8/2015</a:t>
+              <a:t>4/9/2015</a:t>
             </a:fld>
             <a:endParaRPr lang="en-US"/>
           </a:p>
@@ -2247,7 +2249,7 @@
             <a:fld id="{1D8BD707-D9CF-40AE-B4C6-C98DA3205C09}" type="datetimeFigureOut">
               <a:rPr lang="en-US" smtClean="0"/>
               <a:pPr/>
-              <a:t>4/8/2015</a:t>
+              <a:t>4/9/2015</a:t>
             </a:fld>
             <a:endParaRPr lang="en-US"/>
           </a:p>
@@ -2497,7 +2499,7 @@
             <a:fld id="{1D8BD707-D9CF-40AE-B4C6-C98DA3205C09}" type="datetimeFigureOut">
               <a:rPr lang="en-US" smtClean="0"/>
               <a:pPr/>
-              <a:t>4/8/2015</a:t>
+              <a:t>4/9/2015</a:t>
             </a:fld>
             <a:endParaRPr lang="en-US"/>
           </a:p>
@@ -2707,7 +2709,7 @@
             <a:fld id="{1D8BD707-D9CF-40AE-B4C6-C98DA3205C09}" type="datetimeFigureOut">
               <a:rPr lang="en-US" smtClean="0"/>
               <a:pPr/>
-              <a:t>4/8/2015</a:t>
+              <a:t>4/9/2015</a:t>
             </a:fld>
             <a:endParaRPr lang="en-US"/>
           </a:p>
@@ -3443,7 +3445,7 @@
           <a:p>
             <a:r>
               <a:rPr lang="en-AU" dirty="0" smtClean="0"/>
-              <a:t>Basics - Types</a:t>
+              <a:t>The Browser</a:t>
             </a:r>
             <a:endParaRPr lang="en-AU" dirty="0"/>
           </a:p>
@@ -3466,59 +3468,33 @@
           <a:p>
             <a:r>
               <a:rPr lang="en-AU" dirty="0" smtClean="0"/>
-              <a:t>Numbers</a:t>
-            </a:r>
-          </a:p>
-          <a:p>
+              <a:t>JavaScript is </a:t>
+            </a:r>
             <a:r>
               <a:rPr lang="en-AU" dirty="0" smtClean="0"/>
-              <a:t>Arrays</a:t>
+              <a:t>‘interpreted’</a:t>
             </a:r>
           </a:p>
           <a:p>
             <a:r>
               <a:rPr lang="en-AU" dirty="0" smtClean="0"/>
-              <a:t>Strings</a:t>
-            </a:r>
-          </a:p>
-          <a:p>
-            <a:r>
-              <a:rPr lang="en-AU" dirty="0"/>
-              <a:t>Functions and </a:t>
-            </a:r>
+              <a:t>Order matters</a:t>
+            </a:r>
+          </a:p>
+          <a:p>
             <a:r>
               <a:rPr lang="en-AU" dirty="0" smtClean="0"/>
-              <a:t>Objects</a:t>
-            </a:r>
-          </a:p>
-          <a:p>
-            <a:r>
-              <a:rPr lang="en-AU" dirty="0" err="1" smtClean="0"/>
-              <a:t>Truthy</a:t>
-            </a:r>
-            <a:r>
-              <a:rPr lang="en-AU" dirty="0" smtClean="0"/>
-              <a:t> and </a:t>
-            </a:r>
-            <a:r>
-              <a:rPr lang="en-AU" dirty="0" err="1" smtClean="0"/>
-              <a:t>Falsy</a:t>
-            </a:r>
+              <a:t>Loading scripts using the script tag</a:t>
+            </a:r>
+          </a:p>
+          <a:p>
             <a:endParaRPr lang="en-AU" dirty="0" smtClean="0"/>
           </a:p>
           <a:p>
-            <a:r>
-              <a:rPr lang="en-AU" dirty="0" smtClean="0"/>
-              <a:t>Null </a:t>
-            </a:r>
-            <a:r>
-              <a:rPr lang="en-AU" dirty="0" smtClean="0"/>
-              <a:t>vs </a:t>
-            </a:r>
-            <a:r>
-              <a:rPr lang="en-AU" dirty="0" smtClean="0"/>
-              <a:t>Undefined</a:t>
-            </a:r>
+            <a:endParaRPr lang="en-AU" dirty="0" smtClean="0"/>
+          </a:p>
+          <a:p>
+            <a:endParaRPr lang="en-AU" dirty="0" smtClean="0"/>
           </a:p>
           <a:p>
             <a:endParaRPr lang="en-AU" dirty="0" smtClean="0"/>
@@ -3578,6 +3554,133 @@
           <a:p>
             <a:r>
               <a:rPr lang="en-AU" dirty="0" smtClean="0"/>
+              <a:t>Basics - Types</a:t>
+            </a:r>
+            <a:endParaRPr lang="en-AU" dirty="0"/>
+          </a:p>
+        </p:txBody>
+      </p:sp>
+      <p:sp>
+        <p:nvSpPr>
+          <p:cNvPr id="3" name="Content Placeholder 2"/>
+          <p:cNvSpPr>
+            <a:spLocks noGrp="1"/>
+          </p:cNvSpPr>
+          <p:nvPr>
+            <p:ph idx="1"/>
+          </p:nvPr>
+        </p:nvSpPr>
+        <p:spPr/>
+        <p:txBody>
+          <a:bodyPr/>
+          <a:lstStyle/>
+          <a:p>
+            <a:r>
+              <a:rPr lang="en-AU" dirty="0" smtClean="0"/>
+              <a:t>Numbers</a:t>
+            </a:r>
+          </a:p>
+          <a:p>
+            <a:r>
+              <a:rPr lang="en-AU" dirty="0" smtClean="0"/>
+              <a:t>Arrays</a:t>
+            </a:r>
+          </a:p>
+          <a:p>
+            <a:r>
+              <a:rPr lang="en-AU" dirty="0" smtClean="0"/>
+              <a:t>Strings</a:t>
+            </a:r>
+          </a:p>
+          <a:p>
+            <a:r>
+              <a:rPr lang="en-AU" dirty="0"/>
+              <a:t>Functions and </a:t>
+            </a:r>
+            <a:r>
+              <a:rPr lang="en-AU" dirty="0" smtClean="0"/>
+              <a:t>Objects</a:t>
+            </a:r>
+          </a:p>
+          <a:p>
+            <a:r>
+              <a:rPr lang="en-AU" dirty="0" err="1" smtClean="0"/>
+              <a:t>Truthy</a:t>
+            </a:r>
+            <a:r>
+              <a:rPr lang="en-AU" dirty="0" smtClean="0"/>
+              <a:t> and </a:t>
+            </a:r>
+            <a:r>
+              <a:rPr lang="en-AU" dirty="0" err="1" smtClean="0"/>
+              <a:t>Falsy</a:t>
+            </a:r>
+            <a:endParaRPr lang="en-AU" dirty="0" smtClean="0"/>
+          </a:p>
+          <a:p>
+            <a:r>
+              <a:rPr lang="en-AU" dirty="0" smtClean="0"/>
+              <a:t>Null vs Undefined</a:t>
+            </a:r>
+          </a:p>
+          <a:p>
+            <a:endParaRPr lang="en-AU" dirty="0" smtClean="0"/>
+          </a:p>
+          <a:p>
+            <a:endParaRPr lang="en-AU" dirty="0" smtClean="0"/>
+          </a:p>
+          <a:p>
+            <a:endParaRPr lang="en-AU" dirty="0" smtClean="0"/>
+          </a:p>
+        </p:txBody>
+      </p:sp>
+    </p:spTree>
+    <p:extLst>
+      <p:ext uri="{BB962C8B-B14F-4D97-AF65-F5344CB8AC3E}">
+        <p14:creationId xmlns:p14="http://schemas.microsoft.com/office/powerpoint/2010/main" val="2334109483"/>
+      </p:ext>
+    </p:extLst>
+  </p:cSld>
+  <p:clrMapOvr>
+    <a:masterClrMapping/>
+  </p:clrMapOvr>
+</p:sld>
+</file>
+
+<file path=ppt/slides/slide6.xml><?xml version="1.0" encoding="utf-8"?>
+<p:sld xmlns:a="http://schemas.openxmlformats.org/drawingml/2006/main" xmlns:r="http://schemas.openxmlformats.org/officeDocument/2006/relationships" xmlns:p="http://schemas.openxmlformats.org/presentationml/2006/main">
+  <p:cSld>
+    <p:spTree>
+      <p:nvGrpSpPr>
+        <p:cNvPr id="1" name=""/>
+        <p:cNvGrpSpPr/>
+        <p:nvPr/>
+      </p:nvGrpSpPr>
+      <p:grpSpPr>
+        <a:xfrm>
+          <a:off x="0" y="0"/>
+          <a:ext cx="0" cy="0"/>
+          <a:chOff x="0" y="0"/>
+          <a:chExt cx="0" cy="0"/>
+        </a:xfrm>
+      </p:grpSpPr>
+      <p:sp>
+        <p:nvSpPr>
+          <p:cNvPr id="2" name="Title 1"/>
+          <p:cNvSpPr>
+            <a:spLocks noGrp="1"/>
+          </p:cNvSpPr>
+          <p:nvPr>
+            <p:ph type="title"/>
+          </p:nvPr>
+        </p:nvSpPr>
+        <p:spPr/>
+        <p:txBody>
+          <a:bodyPr/>
+          <a:lstStyle/>
+          <a:p>
+            <a:r>
+              <a:rPr lang="en-AU" dirty="0" smtClean="0"/>
               <a:t>Advanced</a:t>
             </a:r>
             <a:endParaRPr lang="en-AU" dirty="0"/>
@@ -3614,11 +3717,7 @@
             <a:pPr lvl="1"/>
             <a:r>
               <a:rPr lang="en-AU" dirty="0" smtClean="0"/>
-              <a:t>What </a:t>
-            </a:r>
-            <a:r>
-              <a:rPr lang="en-AU" dirty="0" smtClean="0"/>
-              <a:t>is ‘this’?</a:t>
+              <a:t>What is ‘this’?</a:t>
             </a:r>
           </a:p>
           <a:p>
@@ -3626,7 +3725,6 @@
               <a:rPr lang="en-AU" dirty="0" smtClean="0"/>
               <a:t>Timeouts and Intervals</a:t>
             </a:r>
-            <a:endParaRPr lang="en-AU" dirty="0" smtClean="0"/>
           </a:p>
           <a:p>
             <a:endParaRPr lang="en-AU" dirty="0" smtClean="0"/>

</xml_diff>